<commit_message>
Update presentation and move port to 8080
</commit_message>
<xml_diff>
--- a/docs/presentation.pptx
+++ b/docs/presentation.pptx
@@ -7,12 +7,13 @@
   <p:sldIdLst>
     <p:sldId id="256" r:id="rId2"/>
     <p:sldId id="259" r:id="rId3"/>
-    <p:sldId id="257" r:id="rId4"/>
-    <p:sldId id="258" r:id="rId5"/>
+    <p:sldId id="264" r:id="rId4"/>
+    <p:sldId id="257" r:id="rId5"/>
     <p:sldId id="260" r:id="rId6"/>
     <p:sldId id="261" r:id="rId7"/>
-    <p:sldId id="262" r:id="rId8"/>
-    <p:sldId id="263" r:id="rId9"/>
+    <p:sldId id="265" r:id="rId8"/>
+    <p:sldId id="262" r:id="rId9"/>
+    <p:sldId id="263" r:id="rId10"/>
   </p:sldIdLst>
   <p:sldSz cx="12192000" cy="6858000"/>
   <p:notesSz cx="6858000" cy="9144000"/>
@@ -111,7 +112,20 @@
       </a:defRPr>
     </a:lvl9pPr>
   </p:defaultTextStyle>
+  <p:extLst>
+    <p:ext uri="{EFAFB233-063F-42B5-8137-9DF3F51BA10A}">
+      <p15:sldGuideLst xmlns:p15="http://schemas.microsoft.com/office/powerpoint/2012/main"/>
+    </p:ext>
+  </p:extLst>
 </p:presentation>
+</file>
+
+<file path=ppt/revisionInfo.xml><?xml version="1.0" encoding="utf-8"?>
+<p1510:revInfo xmlns:a="http://schemas.openxmlformats.org/drawingml/2006/main" xmlns:r="http://schemas.openxmlformats.org/officeDocument/2006/relationships" xmlns:p1510="http://schemas.microsoft.com/office/powerpoint/2015/10/main">
+  <p1510:revLst>
+    <p1510:client id="{7E5429EA-0E76-64A7-A32E-8CDA043D1FDF}" v="500" dt="2025-01-10T15:11:59.138"/>
+  </p1510:revLst>
+</p1510:revInfo>
 </file>
 
 <file path=ppt/slideLayouts/slideLayout1.xml><?xml version="1.0" encoding="utf-8"?>
@@ -340,7 +354,7 @@
           <a:p>
             <a:fld id="{8AB4DE2A-1A3C-4F05-8952-21F4BBBBB131}" type="datetimeFigureOut">
               <a:rPr lang="en-US" smtClean="0"/>
-              <a:t>1/3/2025</a:t>
+              <a:t>1/10/2025</a:t>
             </a:fld>
             <a:endParaRPr lang="en-US"/>
           </a:p>
@@ -548,7 +562,7 @@
           <a:p>
             <a:fld id="{8AB4DE2A-1A3C-4F05-8952-21F4BBBBB131}" type="datetimeFigureOut">
               <a:rPr lang="en-US" smtClean="0"/>
-              <a:t>1/3/2025</a:t>
+              <a:t>1/10/2025</a:t>
             </a:fld>
             <a:endParaRPr lang="en-US"/>
           </a:p>
@@ -804,7 +818,7 @@
           <a:p>
             <a:fld id="{8AB4DE2A-1A3C-4F05-8952-21F4BBBBB131}" type="datetimeFigureOut">
               <a:rPr lang="en-US" smtClean="0"/>
-              <a:t>1/3/2025</a:t>
+              <a:t>1/10/2025</a:t>
             </a:fld>
             <a:endParaRPr lang="en-US"/>
           </a:p>
@@ -978,7 +992,7 @@
           <a:p>
             <a:fld id="{8AB4DE2A-1A3C-4F05-8952-21F4BBBBB131}" type="datetimeFigureOut">
               <a:rPr lang="en-US" smtClean="0"/>
-              <a:t>1/3/2025</a:t>
+              <a:t>1/10/2025</a:t>
             </a:fld>
             <a:endParaRPr lang="en-US"/>
           </a:p>
@@ -1321,7 +1335,7 @@
           <a:p>
             <a:fld id="{8AB4DE2A-1A3C-4F05-8952-21F4BBBBB131}" type="datetimeFigureOut">
               <a:rPr lang="en-US" smtClean="0"/>
-              <a:t>1/3/2025</a:t>
+              <a:t>1/10/2025</a:t>
             </a:fld>
             <a:endParaRPr lang="en-US"/>
           </a:p>
@@ -1596,7 +1610,7 @@
           <a:p>
             <a:fld id="{8AB4DE2A-1A3C-4F05-8952-21F4BBBBB131}" type="datetimeFigureOut">
               <a:rPr lang="en-US" smtClean="0"/>
-              <a:t>1/3/2025</a:t>
+              <a:t>1/10/2025</a:t>
             </a:fld>
             <a:endParaRPr lang="en-US"/>
           </a:p>
@@ -1975,7 +1989,7 @@
           <a:p>
             <a:fld id="{8AB4DE2A-1A3C-4F05-8952-21F4BBBBB131}" type="datetimeFigureOut">
               <a:rPr lang="en-US" smtClean="0"/>
-              <a:t>1/3/2025</a:t>
+              <a:t>1/10/2025</a:t>
             </a:fld>
             <a:endParaRPr lang="en-US"/>
           </a:p>
@@ -2093,7 +2107,7 @@
           <a:p>
             <a:fld id="{8AB4DE2A-1A3C-4F05-8952-21F4BBBBB131}" type="datetimeFigureOut">
               <a:rPr lang="en-US" smtClean="0"/>
-              <a:t>1/3/2025</a:t>
+              <a:t>1/10/2025</a:t>
             </a:fld>
             <a:endParaRPr lang="en-US"/>
           </a:p>
@@ -2264,7 +2278,7 @@
           <a:p>
             <a:fld id="{8AB4DE2A-1A3C-4F05-8952-21F4BBBBB131}" type="datetimeFigureOut">
               <a:rPr lang="en-US" smtClean="0"/>
-              <a:t>1/3/2025</a:t>
+              <a:t>1/10/2025</a:t>
             </a:fld>
             <a:endParaRPr lang="en-US"/>
           </a:p>
@@ -2618,7 +2632,7 @@
           <a:p>
             <a:fld id="{8AB4DE2A-1A3C-4F05-8952-21F4BBBBB131}" type="datetimeFigureOut">
               <a:rPr lang="en-US" smtClean="0"/>
-              <a:t>1/3/2025</a:t>
+              <a:t>1/10/2025</a:t>
             </a:fld>
             <a:endParaRPr lang="en-US"/>
           </a:p>
@@ -3000,7 +3014,7 @@
           <a:p>
             <a:fld id="{8AB4DE2A-1A3C-4F05-8952-21F4BBBBB131}" type="datetimeFigureOut">
               <a:rPr lang="en-US" smtClean="0"/>
-              <a:t>1/3/2025</a:t>
+              <a:t>1/10/2025</a:t>
             </a:fld>
             <a:endParaRPr lang="en-US"/>
           </a:p>
@@ -3287,7 +3301,7 @@
           <a:p>
             <a:fld id="{8AB4DE2A-1A3C-4F05-8952-21F4BBBBB131}" type="datetimeFigureOut">
               <a:rPr lang="en-US" smtClean="0"/>
-              <a:t>1/3/2025</a:t>
+              <a:t>1/10/2025</a:t>
             </a:fld>
             <a:endParaRPr lang="en-US"/>
           </a:p>
@@ -3954,53 +3968,72 @@
           </a:xfrm>
         </p:spPr>
         <p:txBody>
-          <a:bodyPr/>
+          <a:bodyPr vert="horz" lIns="0" tIns="45720" rIns="0" bIns="45720" rtlCol="0" anchor="t">
+            <a:normAutofit/>
+          </a:bodyPr>
           <a:lstStyle/>
           <a:p>
             <a:pPr>
-              <a:buFont typeface="Wingdings" panose="05000000000000000000" pitchFamily="2" charset="2"/>
-              <a:buChar char="§"/>
+              <a:buFont typeface="Arial" panose="05000000000000000000" pitchFamily="2" charset="2"/>
+              <a:buChar char="•"/>
             </a:pPr>
             <a:r>
               <a:rPr lang="en-US" sz="2800" dirty="0"/>
               <a:t> A C application that runs on Linux</a:t>
             </a:r>
+            <a:endParaRPr lang="en-US"/>
           </a:p>
           <a:p>
             <a:pPr>
-              <a:buFont typeface="Wingdings" panose="05000000000000000000" pitchFamily="2" charset="2"/>
-              <a:buChar char="§"/>
+              <a:buFont typeface="Arial" panose="05000000000000000000" pitchFamily="2" charset="2"/>
+              <a:buChar char="•"/>
             </a:pPr>
             <a:r>
               <a:rPr lang="en-US" sz="2800" dirty="0"/>
               <a:t> Serves a webpage to the user</a:t>
             </a:r>
+            <a:endParaRPr lang="en-US" sz="2800" dirty="0">
+              <a:ea typeface="Calibri" panose="020F0502020204030204"/>
+              <a:cs typeface="Calibri" panose="020F0502020204030204"/>
+            </a:endParaRPr>
           </a:p>
           <a:p>
             <a:pPr>
-              <a:buFont typeface="Wingdings" panose="05000000000000000000" pitchFamily="2" charset="2"/>
-              <a:buChar char="§"/>
+              <a:buFont typeface="Arial" panose="05000000000000000000" pitchFamily="2" charset="2"/>
+              <a:buChar char="•"/>
             </a:pPr>
             <a:r>
               <a:rPr lang="en-US" sz="2800" dirty="0"/>
-              <a:t> Accessible via port 8080 </a:t>
-            </a:r>
+              <a:t> Accessible via any port </a:t>
+            </a:r>
+            <a:endParaRPr lang="en-US" sz="2800" dirty="0">
+              <a:ea typeface="Calibri"/>
+              <a:cs typeface="Calibri"/>
+            </a:endParaRPr>
           </a:p>
           <a:p>
             <a:pPr>
-              <a:buFont typeface="Wingdings" panose="05000000000000000000" pitchFamily="2" charset="2"/>
-              <a:buChar char="§"/>
+              <a:buFont typeface="Arial" panose="05000000000000000000" pitchFamily="2" charset="2"/>
+              <a:buChar char="•"/>
             </a:pPr>
             <a:r>
               <a:rPr lang="en-US" sz="2800" dirty="0"/>
-              <a:t> Uses sockets and Linux Api functions</a:t>
-            </a:r>
-          </a:p>
-          <a:p>
-            <a:pPr marL="0" indent="0">
-              <a:buNone/>
+              <a:t> Uses Sockets and Linux Api functions</a:t>
+            </a:r>
+            <a:endParaRPr lang="en-US" sz="2800" dirty="0">
+              <a:ea typeface="Calibri" panose="020F0502020204030204"/>
+              <a:cs typeface="Calibri" panose="020F0502020204030204"/>
+            </a:endParaRPr>
+          </a:p>
+          <a:p>
+            <a:pPr>
+              <a:buFont typeface="Arial" panose="020F0502020204030204" pitchFamily="34" charset="0"/>
+              <a:buChar char="•"/>
             </a:pPr>
-            <a:endParaRPr lang="en-US" dirty="0"/>
+            <a:endParaRPr lang="en-US" dirty="0">
+              <a:ea typeface="Calibri" panose="020F0502020204030204"/>
+              <a:cs typeface="Calibri" panose="020F0502020204030204"/>
+            </a:endParaRPr>
           </a:p>
         </p:txBody>
       </p:sp>
@@ -4075,7 +4108,7 @@
           <p:cNvPr id="2" name="Title 1">
             <a:extLst>
               <a:ext uri="{FF2B5EF4-FFF2-40B4-BE49-F238E27FC236}">
-                <a16:creationId xmlns:a16="http://schemas.microsoft.com/office/drawing/2014/main" id="{584F81FD-E5A9-ED6F-64A4-1913D460DACC}"/>
+                <a16:creationId xmlns:a16="http://schemas.microsoft.com/office/drawing/2014/main" id="{5FCA694F-53C2-5C2D-CFD5-FA6ACC71B5D1}"/>
               </a:ext>
             </a:extLst>
           </p:cNvPr>
@@ -4092,9 +4125,13 @@
           <a:lstStyle/>
           <a:p>
             <a:r>
-              <a:rPr lang="en-US" dirty="0"/>
-              <a:t>How does it work?</a:t>
-            </a:r>
+              <a:rPr lang="en-US" dirty="0">
+                <a:ea typeface="Calibri Light"/>
+                <a:cs typeface="Calibri Light"/>
+              </a:rPr>
+              <a:t>What is a socket?</a:t>
+            </a:r>
+            <a:endParaRPr lang="en-US" dirty="0"/>
           </a:p>
         </p:txBody>
       </p:sp>
@@ -4103,7 +4140,7 @@
           <p:cNvPr id="3" name="Content Placeholder 2">
             <a:extLst>
               <a:ext uri="{FF2B5EF4-FFF2-40B4-BE49-F238E27FC236}">
-                <a16:creationId xmlns:a16="http://schemas.microsoft.com/office/drawing/2014/main" id="{182E2FC3-9FAF-A413-1E05-0ABB979DE4FB}"/>
+                <a16:creationId xmlns:a16="http://schemas.microsoft.com/office/drawing/2014/main" id="{1842A9C9-660C-81ED-C75F-E3184E7B4CCB}"/>
               </a:ext>
             </a:extLst>
           </p:cNvPr>
@@ -4117,52 +4154,100 @@
         <p:spPr>
           <a:xfrm>
             <a:off x="1097280" y="1845734"/>
-            <a:ext cx="4792243" cy="4023360"/>
-          </a:xfrm>
-        </p:spPr>
-        <p:txBody>
-          <a:bodyPr>
+            <a:ext cx="4985983" cy="4023360"/>
+          </a:xfrm>
+        </p:spPr>
+        <p:txBody>
+          <a:bodyPr vert="horz" lIns="0" tIns="45720" rIns="0" bIns="45720" rtlCol="0" anchor="t">
             <a:normAutofit/>
           </a:bodyPr>
           <a:lstStyle/>
           <a:p>
-            <a:pPr marL="457200" indent="-457200">
-              <a:buFont typeface="+mj-lt"/>
-              <a:buAutoNum type="arabicPeriod"/>
+            <a:pPr>
+              <a:buFont typeface="Arial" panose="020F0502020204030204" pitchFamily="34" charset="0"/>
+              <a:buChar char="•"/>
             </a:pPr>
             <a:r>
-              <a:rPr lang="en-US" sz="2800" dirty="0"/>
-              <a:t>A socket is opened</a:t>
-            </a:r>
-          </a:p>
-          <a:p>
-            <a:pPr marL="457200" indent="-457200">
-              <a:buFont typeface="+mj-lt"/>
-              <a:buAutoNum type="arabicPeriod"/>
+              <a:rPr lang="en-US" sz="2400" dirty="0">
+                <a:ea typeface="Calibri" panose="020F0502020204030204"/>
+                <a:cs typeface="Calibri" panose="020F0502020204030204"/>
+              </a:rPr>
+              <a:t> </a:t>
+            </a:r>
+            <a:r>
+              <a:rPr lang="en-US" sz="2800" dirty="0">
+                <a:ea typeface="Calibri" panose="020F0502020204030204"/>
+                <a:cs typeface="Calibri" panose="020F0502020204030204"/>
+              </a:rPr>
+              <a:t>A way of receiving data between processes on the same machine or diff machines</a:t>
+            </a:r>
+          </a:p>
+          <a:p>
+            <a:pPr>
+              <a:buFont typeface="Arial" panose="020F0502020204030204" pitchFamily="34" charset="0"/>
+              <a:buChar char="•"/>
             </a:pPr>
             <a:r>
-              <a:rPr lang="en-US" sz="2800" dirty="0"/>
-              <a:t>Socket is bound to a port 8080</a:t>
-            </a:r>
-          </a:p>
-          <a:p>
-            <a:pPr marL="457200" indent="-457200">
-              <a:buFont typeface="+mj-lt"/>
-              <a:buAutoNum type="arabicPeriod"/>
+              <a:rPr lang="en-US" sz="2800" dirty="0">
+                <a:ea typeface="Calibri" panose="020F0502020204030204"/>
+                <a:cs typeface="Calibri" panose="020F0502020204030204"/>
+              </a:rPr>
+              <a:t> Can use TCP or UDP </a:t>
+            </a:r>
+          </a:p>
+          <a:p>
+            <a:pPr>
+              <a:buFont typeface="Arial" panose="020F0502020204030204" pitchFamily="34" charset="0"/>
+              <a:buChar char="•"/>
             </a:pPr>
             <a:r>
-              <a:rPr lang="en-US" sz="2800" dirty="0"/>
-              <a:t>Listens for incoming connections</a:t>
-            </a:r>
+              <a:rPr lang="en-US" sz="2800" dirty="0">
+                <a:ea typeface="Calibri" panose="020F0502020204030204"/>
+                <a:cs typeface="Calibri" panose="020F0502020204030204"/>
+              </a:rPr>
+              <a:t> Defined in </a:t>
+            </a:r>
+            <a:r>
+              <a:rPr lang="en-US" sz="2800" err="1">
+                <a:ea typeface="Calibri" panose="020F0502020204030204"/>
+                <a:cs typeface="Calibri" panose="020F0502020204030204"/>
+              </a:rPr>
+              <a:t>socket.h</a:t>
+            </a:r>
+            <a:r>
+              <a:rPr lang="en-US" sz="2800" dirty="0">
+                <a:ea typeface="Calibri" panose="020F0502020204030204"/>
+                <a:cs typeface="Calibri" panose="020F0502020204030204"/>
+              </a:rPr>
+              <a:t> header in UNIX-like systems</a:t>
+            </a:r>
+          </a:p>
+          <a:p>
+            <a:pPr marL="0" indent="0">
+              <a:buNone/>
+            </a:pPr>
+            <a:endParaRPr lang="en-US" dirty="0">
+              <a:ea typeface="Calibri" panose="020F0502020204030204"/>
+              <a:cs typeface="Calibri" panose="020F0502020204030204"/>
+            </a:endParaRPr>
+          </a:p>
+          <a:p>
+            <a:pPr marL="0" indent="0">
+              <a:buNone/>
+            </a:pPr>
+            <a:endParaRPr lang="en-US" dirty="0">
+              <a:ea typeface="Calibri" panose="020F0502020204030204"/>
+              <a:cs typeface="Calibri" panose="020F0502020204030204"/>
+            </a:endParaRPr>
           </a:p>
         </p:txBody>
       </p:sp>
       <p:pic>
         <p:nvPicPr>
-          <p:cNvPr id="5" name="Picture 4">
+          <p:cNvPr id="5" name="Picture 4" descr="A diagram of a computer program&#10;&#10;Description automatically generated">
             <a:extLst>
               <a:ext uri="{FF2B5EF4-FFF2-40B4-BE49-F238E27FC236}">
-                <a16:creationId xmlns:a16="http://schemas.microsoft.com/office/drawing/2014/main" id="{5304A883-854C-D199-86C9-3DA235039376}"/>
+                <a16:creationId xmlns:a16="http://schemas.microsoft.com/office/drawing/2014/main" id="{406FF7FC-5D2B-2182-5A7E-0601D6153E17}"/>
               </a:ext>
             </a:extLst>
           </p:cNvPr>
@@ -4172,15 +4257,81 @@
           <p:nvPr/>
         </p:nvPicPr>
         <p:blipFill>
-          <a:blip r:embed="rId2"/>
+          <a:blip r:embed="rId2">
+            <a:extLst>
+              <a:ext uri="{28A0092B-C50C-407E-A947-70E740481C1C}">
+                <a14:useLocalDpi xmlns:a14="http://schemas.microsoft.com/office/drawing/2010/main" val="0"/>
+              </a:ext>
+            </a:extLst>
+          </a:blip>
           <a:stretch>
             <a:fillRect/>
           </a:stretch>
         </p:blipFill>
         <p:spPr>
           <a:xfrm>
-            <a:off x="5567680" y="1845734"/>
-            <a:ext cx="6392996" cy="2489926"/>
+            <a:off x="7291618" y="582704"/>
+            <a:ext cx="3864062" cy="5692591"/>
+          </a:xfrm>
+          <a:prstGeom prst="rect">
+            <a:avLst/>
+          </a:prstGeom>
+        </p:spPr>
+      </p:pic>
+      <p:pic>
+        <p:nvPicPr>
+          <p:cNvPr id="6" name="Picture 5" descr="Penguin Linux Tux Crystal Bumper Sticker Window Water Bottle Decal 5&quot;">
+            <a:extLst>
+              <a:ext uri="{FF2B5EF4-FFF2-40B4-BE49-F238E27FC236}">
+                <a16:creationId xmlns:a16="http://schemas.microsoft.com/office/drawing/2014/main" id="{F5B4815D-92E9-2DAB-87BF-3BF89A19964A}"/>
+              </a:ext>
+            </a:extLst>
+          </p:cNvPr>
+          <p:cNvPicPr>
+            <a:picLocks noChangeAspect="1"/>
+          </p:cNvPicPr>
+          <p:nvPr/>
+        </p:nvPicPr>
+        <p:blipFill>
+          <a:blip r:embed="rId3"/>
+          <a:stretch>
+            <a:fillRect/>
+          </a:stretch>
+        </p:blipFill>
+        <p:spPr>
+          <a:xfrm>
+            <a:off x="6569869" y="557212"/>
+            <a:ext cx="1112046" cy="945358"/>
+          </a:xfrm>
+          <a:prstGeom prst="rect">
+            <a:avLst/>
+          </a:prstGeom>
+        </p:spPr>
+      </p:pic>
+      <p:pic>
+        <p:nvPicPr>
+          <p:cNvPr id="7" name="Picture 6" descr="r/firefox - What Firefox icon do you use/is your favorite?">
+            <a:extLst>
+              <a:ext uri="{FF2B5EF4-FFF2-40B4-BE49-F238E27FC236}">
+                <a16:creationId xmlns:a16="http://schemas.microsoft.com/office/drawing/2014/main" id="{ACC661A1-DDAA-B445-AF15-E60AF4E89844}"/>
+              </a:ext>
+            </a:extLst>
+          </p:cNvPr>
+          <p:cNvPicPr>
+            <a:picLocks noChangeAspect="1"/>
+          </p:cNvPicPr>
+          <p:nvPr/>
+        </p:nvPicPr>
+        <p:blipFill>
+          <a:blip r:embed="rId4"/>
+          <a:stretch>
+            <a:fillRect/>
+          </a:stretch>
+        </p:blipFill>
+        <p:spPr>
+          <a:xfrm>
+            <a:off x="10849721" y="555010"/>
+            <a:ext cx="874987" cy="948691"/>
           </a:xfrm>
           <a:prstGeom prst="rect">
             <a:avLst/>
@@ -4190,7 +4341,7 @@
     </p:spTree>
     <p:extLst>
       <p:ext uri="{BB962C8B-B14F-4D97-AF65-F5344CB8AC3E}">
-        <p14:creationId xmlns:p14="http://schemas.microsoft.com/office/powerpoint/2010/main" val="789881037"/>
+        <p14:creationId xmlns:p14="http://schemas.microsoft.com/office/powerpoint/2010/main" val="651216021"/>
       </p:ext>
     </p:extLst>
   </p:cSld>
@@ -4222,7 +4373,7 @@
           <p:cNvPr id="2" name="Title 1">
             <a:extLst>
               <a:ext uri="{FF2B5EF4-FFF2-40B4-BE49-F238E27FC236}">
-                <a16:creationId xmlns:a16="http://schemas.microsoft.com/office/drawing/2014/main" id="{EC762F2A-3E5C-FC94-E8F4-531A1076BFA3}"/>
+                <a16:creationId xmlns:a16="http://schemas.microsoft.com/office/drawing/2014/main" id="{584F81FD-E5A9-ED6F-64A4-1913D460DACC}"/>
               </a:ext>
             </a:extLst>
           </p:cNvPr>
@@ -4240,7 +4391,7 @@
           <a:p>
             <a:r>
               <a:rPr lang="en-US" dirty="0"/>
-              <a:t>Loop continuously</a:t>
+              <a:t>How does the server work?</a:t>
             </a:r>
           </a:p>
         </p:txBody>
@@ -4250,7 +4401,7 @@
           <p:cNvPr id="3" name="Content Placeholder 2">
             <a:extLst>
               <a:ext uri="{FF2B5EF4-FFF2-40B4-BE49-F238E27FC236}">
-                <a16:creationId xmlns:a16="http://schemas.microsoft.com/office/drawing/2014/main" id="{602E555B-5BA9-8575-496F-818479880675}"/>
+                <a16:creationId xmlns:a16="http://schemas.microsoft.com/office/drawing/2014/main" id="{182E2FC3-9FAF-A413-1E05-0ABB979DE4FB}"/>
               </a:ext>
             </a:extLst>
           </p:cNvPr>
@@ -4264,68 +4415,68 @@
         <p:spPr>
           <a:xfrm>
             <a:off x="1097280" y="1845734"/>
-            <a:ext cx="4044991" cy="4023360"/>
-          </a:xfrm>
-        </p:spPr>
-        <p:txBody>
-          <a:bodyPr>
+            <a:ext cx="5042451" cy="4023360"/>
+          </a:xfrm>
+        </p:spPr>
+        <p:txBody>
+          <a:bodyPr vert="horz" lIns="0" tIns="45720" rIns="0" bIns="45720" rtlCol="0" anchor="t">
             <a:normAutofit/>
           </a:bodyPr>
           <a:lstStyle/>
           <a:p>
-            <a:pPr>
-              <a:buFont typeface="Wingdings" panose="05000000000000000000" pitchFamily="2" charset="2"/>
-              <a:buChar char="§"/>
+            <a:pPr marL="457200" indent="-457200">
+              <a:buFont typeface="+mj-lt"/>
+              <a:buAutoNum type="arabicPeriod"/>
             </a:pPr>
             <a:r>
               <a:rPr lang="en-US" sz="2800" dirty="0"/>
-              <a:t> </a:t>
-            </a:r>
-            <a:r>
-              <a:rPr lang="en-US" sz="2800" dirty="0" err="1"/>
-              <a:t>Continiously</a:t>
-            </a:r>
+              <a:t>A socket is opened</a:t>
+            </a:r>
+          </a:p>
+          <a:p>
+            <a:pPr marL="457200" indent="-457200">
+              <a:buFont typeface="+mj-lt"/>
+              <a:buAutoNum type="arabicPeriod"/>
+            </a:pPr>
             <a:r>
               <a:rPr lang="en-US" sz="2800" dirty="0"/>
-              <a:t> loop to accept clients up to maximum 10</a:t>
-            </a:r>
-          </a:p>
-          <a:p>
-            <a:pPr>
-              <a:buFont typeface="Wingdings" panose="05000000000000000000" pitchFamily="2" charset="2"/>
-              <a:buChar char="§"/>
+              <a:t>Socket is bound to a port like: 8080 or 80</a:t>
+            </a:r>
+            <a:endParaRPr lang="en-US" sz="2800" dirty="0">
+              <a:ea typeface="Calibri"/>
+              <a:cs typeface="Calibri"/>
+            </a:endParaRPr>
+          </a:p>
+          <a:p>
+            <a:pPr marL="457200" indent="-457200">
+              <a:buFont typeface="+mj-lt"/>
+              <a:buAutoNum type="arabicPeriod"/>
             </a:pPr>
             <a:r>
               <a:rPr lang="en-US" sz="2800" dirty="0"/>
-              <a:t> Create a new thread for each client</a:t>
-            </a:r>
-          </a:p>
-          <a:p>
-            <a:pPr>
-              <a:buFont typeface="Wingdings" panose="05000000000000000000" pitchFamily="2" charset="2"/>
-              <a:buChar char="§"/>
+              <a:t>Listens for incoming connections</a:t>
+            </a:r>
+          </a:p>
+          <a:p>
+            <a:pPr marL="457200" indent="-457200">
+              <a:buAutoNum type="arabicPeriod"/>
             </a:pPr>
             <a:r>
-              <a:rPr lang="en-US" sz="2800" dirty="0"/>
-              <a:t> Thread start at </a:t>
-            </a:r>
-            <a:r>
-              <a:rPr lang="en-US" sz="2800" dirty="0" err="1"/>
-              <a:t>handle_client</a:t>
-            </a:r>
-            <a:r>
-              <a:rPr lang="en-US" sz="2800" dirty="0"/>
-              <a:t>()</a:t>
+              <a:rPr lang="en-US" sz="2800" dirty="0">
+                <a:ea typeface="Calibri" panose="020F0502020204030204"/>
+                <a:cs typeface="Calibri" panose="020F0502020204030204"/>
+              </a:rPr>
+              <a:t>Accept the clients and serve them what they want, as long as it is on the menu, of course</a:t>
             </a:r>
           </a:p>
         </p:txBody>
       </p:sp>
       <p:pic>
         <p:nvPicPr>
-          <p:cNvPr id="7" name="Picture 6" descr="A diagram of a computer program&#10;&#10;Description automatically generated">
+          <p:cNvPr id="4" name="Picture 3" descr="Restaurant Server Cartoons and Comics - funny pictures from CartoonStock">
             <a:extLst>
               <a:ext uri="{FF2B5EF4-FFF2-40B4-BE49-F238E27FC236}">
-                <a16:creationId xmlns:a16="http://schemas.microsoft.com/office/drawing/2014/main" id="{90F9236F-35FF-3FE5-355B-FD7FFF414261}"/>
+                <a16:creationId xmlns:a16="http://schemas.microsoft.com/office/drawing/2014/main" id="{E6CEEC3C-DC03-A5EC-5C21-A611D64C3E96}"/>
               </a:ext>
             </a:extLst>
           </p:cNvPr>
@@ -4335,21 +4486,15 @@
           <p:nvPr/>
         </p:nvPicPr>
         <p:blipFill>
-          <a:blip r:embed="rId2">
-            <a:extLst>
-              <a:ext uri="{28A0092B-C50C-407E-A947-70E740481C1C}">
-                <a14:useLocalDpi xmlns:a14="http://schemas.microsoft.com/office/drawing/2010/main" val="0"/>
-              </a:ext>
-            </a:extLst>
-          </a:blip>
+          <a:blip r:embed="rId2"/>
           <a:stretch>
             <a:fillRect/>
           </a:stretch>
         </p:blipFill>
         <p:spPr>
           <a:xfrm>
-            <a:off x="7291618" y="582704"/>
-            <a:ext cx="3864062" cy="5692591"/>
+            <a:off x="7351594" y="1746099"/>
+            <a:ext cx="4062483" cy="4412129"/>
           </a:xfrm>
           <a:prstGeom prst="rect">
             <a:avLst/>
@@ -4359,7 +4504,7 @@
     </p:spTree>
     <p:extLst>
       <p:ext uri="{BB962C8B-B14F-4D97-AF65-F5344CB8AC3E}">
-        <p14:creationId xmlns:p14="http://schemas.microsoft.com/office/powerpoint/2010/main" val="3865698661"/>
+        <p14:creationId xmlns:p14="http://schemas.microsoft.com/office/powerpoint/2010/main" val="789881037"/>
       </p:ext>
     </p:extLst>
   </p:cSld>
@@ -4409,7 +4554,7 @@
           <a:p>
             <a:r>
               <a:rPr lang="en-US" dirty="0"/>
-              <a:t>HTTP Method GET</a:t>
+              <a:t>How does it serve exactly? </a:t>
             </a:r>
           </a:p>
         </p:txBody>
@@ -4437,58 +4582,74 @@
           </a:xfrm>
         </p:spPr>
         <p:txBody>
-          <a:bodyPr>
+          <a:bodyPr vert="horz" lIns="0" tIns="45720" rIns="0" bIns="45720" rtlCol="0" anchor="t">
             <a:normAutofit/>
           </a:bodyPr>
           <a:lstStyle/>
           <a:p>
             <a:pPr>
-              <a:buFont typeface="Wingdings" panose="05000000000000000000" pitchFamily="2" charset="2"/>
-              <a:buChar char="§"/>
+              <a:buFont typeface="Arial" panose="020F0502020204030204" pitchFamily="34" charset="0"/>
+              <a:buChar char="•"/>
             </a:pPr>
             <a:r>
               <a:rPr lang="en-US" sz="2800" dirty="0"/>
-              <a:t> GET is used to request data from a specified resource</a:t>
-            </a:r>
+              <a:t> GET is used by the client to request a certain file</a:t>
+            </a:r>
+            <a:endParaRPr lang="en-US" sz="2800" dirty="0">
+              <a:ea typeface="Calibri"/>
+              <a:cs typeface="Calibri"/>
+            </a:endParaRPr>
           </a:p>
           <a:p>
             <a:pPr>
-              <a:buFont typeface="Wingdings" panose="05000000000000000000" pitchFamily="2" charset="2"/>
-              <a:buChar char="§"/>
+              <a:buFont typeface="Arial" panose="020F0502020204030204" pitchFamily="34" charset="0"/>
+              <a:buChar char="•"/>
             </a:pPr>
             <a:r>
               <a:rPr lang="en-US" sz="2800" dirty="0"/>
               <a:t> If it is empty, then it reply with index.html</a:t>
             </a:r>
+            <a:endParaRPr lang="en-US" sz="2800" dirty="0">
+              <a:ea typeface="Calibri" panose="020F0502020204030204"/>
+              <a:cs typeface="Calibri" panose="020F0502020204030204"/>
+            </a:endParaRPr>
           </a:p>
           <a:p>
             <a:pPr>
-              <a:buFont typeface="Wingdings" panose="05000000000000000000" pitchFamily="2" charset="2"/>
-              <a:buChar char="§"/>
+              <a:buFont typeface="Arial" panose="020F0502020204030204" pitchFamily="34" charset="0"/>
+              <a:buChar char="•"/>
             </a:pPr>
             <a:r>
               <a:rPr lang="en-US" sz="2800" dirty="0"/>
               <a:t> Use send() to transmit the data via the socket</a:t>
             </a:r>
+            <a:endParaRPr lang="en-US" sz="2800" dirty="0">
+              <a:ea typeface="Calibri" panose="020F0502020204030204"/>
+              <a:cs typeface="Calibri" panose="020F0502020204030204"/>
+            </a:endParaRPr>
           </a:p>
           <a:p>
             <a:pPr>
-              <a:buFont typeface="Wingdings" panose="05000000000000000000" pitchFamily="2" charset="2"/>
-              <a:buChar char="§"/>
+              <a:buFont typeface="Arial" panose="020F0502020204030204" pitchFamily="34" charset="0"/>
+              <a:buChar char="•"/>
             </a:pPr>
             <a:r>
               <a:rPr lang="en-US" sz="2800" dirty="0"/>
-              <a:t> Free the memory</a:t>
-            </a:r>
+              <a:t> Free the memory – dynamic allocation</a:t>
+            </a:r>
+            <a:endParaRPr lang="en-US" sz="2800" dirty="0">
+              <a:ea typeface="Calibri"/>
+              <a:cs typeface="Calibri"/>
+            </a:endParaRPr>
           </a:p>
         </p:txBody>
       </p:sp>
       <p:pic>
         <p:nvPicPr>
-          <p:cNvPr id="5" name="Picture 4" descr="A screenshot of a computer program&#10;&#10;Description automatically generated">
+          <p:cNvPr id="4" name="Picture 3" descr="GET Vs. POST: Key Difference Between HTTP Methods">
             <a:extLst>
               <a:ext uri="{FF2B5EF4-FFF2-40B4-BE49-F238E27FC236}">
-                <a16:creationId xmlns:a16="http://schemas.microsoft.com/office/drawing/2014/main" id="{73E1E563-64E4-ED39-C530-1F4BFEA4723E}"/>
+                <a16:creationId xmlns:a16="http://schemas.microsoft.com/office/drawing/2014/main" id="{5240E198-3AE9-A10D-ED0D-6B6902275215}"/>
               </a:ext>
             </a:extLst>
           </p:cNvPr>
@@ -4498,21 +4659,15 @@
           <p:nvPr/>
         </p:nvPicPr>
         <p:blipFill>
-          <a:blip r:embed="rId2">
-            <a:extLst>
-              <a:ext uri="{28A0092B-C50C-407E-A947-70E740481C1C}">
-                <a14:useLocalDpi xmlns:a14="http://schemas.microsoft.com/office/drawing/2010/main" val="0"/>
-              </a:ext>
-            </a:extLst>
-          </a:blip>
+          <a:blip r:embed="rId2"/>
           <a:stretch>
             <a:fillRect/>
           </a:stretch>
         </p:blipFill>
         <p:spPr>
           <a:xfrm>
-            <a:off x="6096000" y="1843677"/>
-            <a:ext cx="5879342" cy="3170645"/>
+            <a:off x="5691117" y="1844893"/>
+            <a:ext cx="6473587" cy="3190959"/>
           </a:xfrm>
           <a:prstGeom prst="rect">
             <a:avLst/>
@@ -4572,7 +4727,7 @@
           <a:p>
             <a:r>
               <a:rPr lang="en-US" dirty="0"/>
-              <a:t>Request must match file structure</a:t>
+              <a:t>So what is "on the menu" ?</a:t>
             </a:r>
           </a:p>
         </p:txBody>
@@ -4600,44 +4755,55 @@
           </a:xfrm>
         </p:spPr>
         <p:txBody>
-          <a:bodyPr>
+          <a:bodyPr vert="horz" lIns="0" tIns="45720" rIns="0" bIns="45720" rtlCol="0" anchor="t">
             <a:normAutofit/>
           </a:bodyPr>
           <a:lstStyle/>
           <a:p>
             <a:pPr>
-              <a:buFont typeface="Wingdings" panose="05000000000000000000" pitchFamily="2" charset="2"/>
-              <a:buChar char="§"/>
+              <a:buFont typeface="Arial"/>
+              <a:buChar char="•"/>
             </a:pPr>
             <a:r>
               <a:rPr lang="en-US" sz="2800" dirty="0"/>
-              <a:t> Each HTML GET must req a file from </a:t>
+              <a:t> Each HTML GET must req a file from "</a:t>
             </a:r>
             <a:r>
               <a:rPr lang="en-US" sz="2800" dirty="0" err="1"/>
               <a:t>src</a:t>
             </a:r>
-            <a:endParaRPr lang="en-US" sz="2800" dirty="0"/>
+            <a:r>
+              <a:rPr lang="en-US" sz="2800" dirty="0"/>
+              <a:t>/"</a:t>
+            </a:r>
+            <a:endParaRPr lang="en-US" sz="2800" dirty="0">
+              <a:ea typeface="Calibri" panose="020F0502020204030204"/>
+              <a:cs typeface="Calibri" panose="020F0502020204030204"/>
+            </a:endParaRPr>
           </a:p>
           <a:p>
             <a:pPr>
-              <a:buFont typeface="Wingdings" panose="05000000000000000000" pitchFamily="2" charset="2"/>
-              <a:buChar char="§"/>
+              <a:buFont typeface="Arial"/>
+              <a:buChar char="•"/>
             </a:pPr>
             <a:r>
               <a:rPr lang="en-US" sz="2800" dirty="0"/>
               <a:t> Otherwise, it will be rejected with 404</a:t>
             </a:r>
+            <a:endParaRPr lang="en-US" sz="2800" dirty="0">
+              <a:ea typeface="Calibri" panose="020F0502020204030204"/>
+              <a:cs typeface="Calibri" panose="020F0502020204030204"/>
+            </a:endParaRPr>
           </a:p>
           <a:p>
             <a:pPr>
-              <a:buFont typeface="Wingdings" panose="05000000000000000000" pitchFamily="2" charset="2"/>
-              <a:buChar char="§"/>
+              <a:buFont typeface="Arial"/>
+              <a:buChar char="•"/>
             </a:pPr>
-            <a:r>
-              <a:rPr lang="en-US" sz="2800" dirty="0"/>
-              <a:t> Data type is encoded via MIME </a:t>
-            </a:r>
+            <a:endParaRPr lang="en-US" sz="2800" dirty="0">
+              <a:ea typeface="Calibri" panose="020F0502020204030204"/>
+              <a:cs typeface="Calibri" panose="020F0502020204030204"/>
+            </a:endParaRPr>
           </a:p>
         </p:txBody>
       </p:sp>
@@ -4663,8 +4829,8 @@
         </p:blipFill>
         <p:spPr>
           <a:xfrm>
-            <a:off x="6803922" y="1981132"/>
-            <a:ext cx="4070555" cy="762068"/>
+            <a:off x="6803922" y="1753670"/>
+            <a:ext cx="5207868" cy="1057768"/>
           </a:xfrm>
           <a:prstGeom prst="rect">
             <a:avLst/>
@@ -4673,10 +4839,10 @@
       </p:pic>
       <p:pic>
         <p:nvPicPr>
-          <p:cNvPr id="7" name="Picture 6">
+          <p:cNvPr id="4" name="Picture 3" descr="A screen shot of a computer program&#10;&#10;Description automatically generated">
             <a:extLst>
               <a:ext uri="{FF2B5EF4-FFF2-40B4-BE49-F238E27FC236}">
-                <a16:creationId xmlns:a16="http://schemas.microsoft.com/office/drawing/2014/main" id="{021FBDAB-B58B-E0F4-799E-229DB1BAE820}"/>
+                <a16:creationId xmlns:a16="http://schemas.microsoft.com/office/drawing/2014/main" id="{BA66FA77-BA4D-D0A3-E007-4169060FF4AA}"/>
               </a:ext>
             </a:extLst>
           </p:cNvPr>
@@ -4693,8 +4859,38 @@
         </p:blipFill>
         <p:spPr>
           <a:xfrm>
-            <a:off x="6803922" y="2845397"/>
-            <a:ext cx="4070555" cy="3726000"/>
+            <a:off x="6807993" y="2835571"/>
+            <a:ext cx="5217568" cy="4023389"/>
+          </a:xfrm>
+          <a:prstGeom prst="rect">
+            <a:avLst/>
+          </a:prstGeom>
+        </p:spPr>
+      </p:pic>
+      <p:pic>
+        <p:nvPicPr>
+          <p:cNvPr id="6" name="Picture 5" descr="Funny 404 page example">
+            <a:extLst>
+              <a:ext uri="{FF2B5EF4-FFF2-40B4-BE49-F238E27FC236}">
+                <a16:creationId xmlns:a16="http://schemas.microsoft.com/office/drawing/2014/main" id="{B23A9888-5135-EB17-34CB-A67AD5080DD5}"/>
+              </a:ext>
+            </a:extLst>
+          </p:cNvPr>
+          <p:cNvPicPr>
+            <a:picLocks noChangeAspect="1"/>
+          </p:cNvPicPr>
+          <p:nvPr/>
+        </p:nvPicPr>
+        <p:blipFill>
+          <a:blip r:embed="rId4"/>
+          <a:stretch>
+            <a:fillRect/>
+          </a:stretch>
+        </p:blipFill>
+        <p:spPr>
+          <a:xfrm>
+            <a:off x="1092994" y="3857681"/>
+            <a:ext cx="5505447" cy="3000263"/>
           </a:xfrm>
           <a:prstGeom prst="rect">
             <a:avLst/>
@@ -4736,6 +4932,244 @@
           <p:cNvPr id="2" name="Title 1">
             <a:extLst>
               <a:ext uri="{FF2B5EF4-FFF2-40B4-BE49-F238E27FC236}">
+                <a16:creationId xmlns:a16="http://schemas.microsoft.com/office/drawing/2014/main" id="{699A903B-928C-9811-5117-775064AAF779}"/>
+              </a:ext>
+            </a:extLst>
+          </p:cNvPr>
+          <p:cNvSpPr>
+            <a:spLocks noGrp="1"/>
+          </p:cNvSpPr>
+          <p:nvPr>
+            <p:ph type="title"/>
+          </p:nvPr>
+        </p:nvSpPr>
+        <p:spPr/>
+        <p:txBody>
+          <a:bodyPr/>
+          <a:lstStyle/>
+          <a:p>
+            <a:r>
+              <a:rPr lang="en-US" dirty="0">
+                <a:ea typeface="Calibri Light"/>
+                <a:cs typeface="Calibri Light"/>
+              </a:rPr>
+              <a:t>DEMO run of the HTTP-Webserver</a:t>
+            </a:r>
+            <a:endParaRPr lang="en-US" dirty="0"/>
+          </a:p>
+        </p:txBody>
+      </p:sp>
+      <p:sp>
+        <p:nvSpPr>
+          <p:cNvPr id="3" name="Content Placeholder 2">
+            <a:extLst>
+              <a:ext uri="{FF2B5EF4-FFF2-40B4-BE49-F238E27FC236}">
+                <a16:creationId xmlns:a16="http://schemas.microsoft.com/office/drawing/2014/main" id="{5DC577EC-E43C-BDB6-4D8B-FF3B967D3463}"/>
+              </a:ext>
+            </a:extLst>
+          </p:cNvPr>
+          <p:cNvSpPr>
+            <a:spLocks noGrp="1"/>
+          </p:cNvSpPr>
+          <p:nvPr>
+            <p:ph idx="1"/>
+          </p:nvPr>
+        </p:nvSpPr>
+        <p:spPr>
+          <a:xfrm>
+            <a:off x="1097280" y="1845734"/>
+            <a:ext cx="4985983" cy="4023360"/>
+          </a:xfrm>
+        </p:spPr>
+        <p:txBody>
+          <a:bodyPr vert="horz" lIns="0" tIns="45720" rIns="0" bIns="45720" rtlCol="0" anchor="t">
+            <a:normAutofit/>
+          </a:bodyPr>
+          <a:lstStyle/>
+          <a:p>
+            <a:pPr>
+              <a:buFont typeface="Arial" panose="020F0502020204030204" pitchFamily="34" charset="0"/>
+              <a:buChar char="•"/>
+            </a:pPr>
+            <a:r>
+              <a:rPr lang="en-US" sz="2800" dirty="0">
+                <a:ea typeface="Calibri"/>
+                <a:cs typeface="Calibri"/>
+              </a:rPr>
+              <a:t> Present the build system</a:t>
+            </a:r>
+            <a:endParaRPr lang="en-US" dirty="0">
+              <a:ea typeface="Calibri" panose="020F0502020204030204"/>
+              <a:cs typeface="Calibri" panose="020F0502020204030204"/>
+            </a:endParaRPr>
+          </a:p>
+          <a:p>
+            <a:pPr>
+              <a:buFont typeface="Arial" panose="020F0502020204030204" pitchFamily="34" charset="0"/>
+              <a:buChar char="•"/>
+            </a:pPr>
+            <a:r>
+              <a:rPr lang="en-US" sz="2800" dirty="0">
+                <a:ea typeface="Calibri"/>
+                <a:cs typeface="Calibri"/>
+              </a:rPr>
+              <a:t> Present the source and headers</a:t>
+            </a:r>
+          </a:p>
+          <a:p>
+            <a:pPr>
+              <a:buFont typeface="Arial" panose="020F0502020204030204" pitchFamily="34" charset="0"/>
+              <a:buChar char="•"/>
+            </a:pPr>
+            <a:r>
+              <a:rPr lang="en-US" sz="2800" dirty="0">
+                <a:ea typeface="Calibri"/>
+                <a:cs typeface="Calibri"/>
+              </a:rPr>
+              <a:t> Present the main function</a:t>
+            </a:r>
+          </a:p>
+          <a:p>
+            <a:pPr>
+              <a:buFont typeface="Arial" panose="020F0502020204030204" pitchFamily="34" charset="0"/>
+              <a:buChar char="•"/>
+            </a:pPr>
+            <a:r>
+              <a:rPr lang="en-US" sz="2800" dirty="0">
+                <a:ea typeface="Calibri"/>
+                <a:cs typeface="Calibri"/>
+              </a:rPr>
+              <a:t> Build the </a:t>
+            </a:r>
+            <a:r>
+              <a:rPr lang="en-US" sz="2800" dirty="0" err="1">
+                <a:ea typeface="Calibri"/>
+                <a:cs typeface="Calibri"/>
+              </a:rPr>
+              <a:t>proj</a:t>
+            </a:r>
+            <a:r>
+              <a:rPr lang="en-US" sz="2800" dirty="0">
+                <a:ea typeface="Calibri"/>
+                <a:cs typeface="Calibri"/>
+              </a:rPr>
+              <a:t> &amp; run it</a:t>
+            </a:r>
+          </a:p>
+          <a:p>
+            <a:pPr>
+              <a:buFont typeface="Arial" panose="020F0502020204030204" pitchFamily="34" charset="0"/>
+              <a:buChar char="•"/>
+            </a:pPr>
+            <a:r>
+              <a:rPr lang="en-US" sz="2800" dirty="0">
+                <a:ea typeface="Calibri"/>
+                <a:cs typeface="Calibri"/>
+              </a:rPr>
+              <a:t> Open </a:t>
+            </a:r>
+            <a:r>
+              <a:rPr lang="en-US" sz="2800" dirty="0" err="1">
+                <a:ea typeface="Calibri"/>
+                <a:cs typeface="Calibri"/>
+              </a:rPr>
+              <a:t>firefox</a:t>
+            </a:r>
+            <a:r>
+              <a:rPr lang="en-US" sz="2800" dirty="0">
+                <a:ea typeface="Calibri"/>
+                <a:cs typeface="Calibri"/>
+              </a:rPr>
+              <a:t> and show the index.html file</a:t>
+            </a:r>
+          </a:p>
+          <a:p>
+            <a:pPr>
+              <a:buFont typeface="Arial" panose="020F0502020204030204" pitchFamily="34" charset="0"/>
+              <a:buChar char="•"/>
+            </a:pPr>
+            <a:endParaRPr lang="en-US" sz="2800" dirty="0">
+              <a:ea typeface="Calibri"/>
+              <a:cs typeface="Calibri"/>
+            </a:endParaRPr>
+          </a:p>
+          <a:p>
+            <a:pPr>
+              <a:buFont typeface="Arial"/>
+              <a:buChar char="•"/>
+            </a:pPr>
+            <a:endParaRPr lang="en-US" sz="2800" dirty="0">
+              <a:ea typeface="Calibri"/>
+              <a:cs typeface="Calibri"/>
+            </a:endParaRPr>
+          </a:p>
+        </p:txBody>
+      </p:sp>
+      <p:pic>
+        <p:nvPicPr>
+          <p:cNvPr id="4" name="Picture 3" descr="Demo text with marker">
+            <a:extLst>
+              <a:ext uri="{FF2B5EF4-FFF2-40B4-BE49-F238E27FC236}">
+                <a16:creationId xmlns:a16="http://schemas.microsoft.com/office/drawing/2014/main" id="{E728BF34-D57C-F4C3-3E87-99163F7A10CD}"/>
+              </a:ext>
+            </a:extLst>
+          </p:cNvPr>
+          <p:cNvPicPr>
+            <a:picLocks noChangeAspect="1"/>
+          </p:cNvPicPr>
+          <p:nvPr/>
+        </p:nvPicPr>
+        <p:blipFill>
+          <a:blip r:embed="rId2"/>
+          <a:stretch>
+            <a:fillRect/>
+          </a:stretch>
+        </p:blipFill>
+        <p:spPr>
+          <a:xfrm>
+            <a:off x="6789513" y="1843763"/>
+            <a:ext cx="4957762" cy="3400424"/>
+          </a:xfrm>
+          <a:prstGeom prst="rect">
+            <a:avLst/>
+          </a:prstGeom>
+        </p:spPr>
+      </p:pic>
+    </p:spTree>
+    <p:extLst>
+      <p:ext uri="{BB962C8B-B14F-4D97-AF65-F5344CB8AC3E}">
+        <p14:creationId xmlns:p14="http://schemas.microsoft.com/office/powerpoint/2010/main" val="1868054960"/>
+      </p:ext>
+    </p:extLst>
+  </p:cSld>
+  <p:clrMapOvr>
+    <a:masterClrMapping/>
+  </p:clrMapOvr>
+</p:sld>
+</file>
+
+<file path=ppt/slides/slide8.xml><?xml version="1.0" encoding="utf-8"?>
+<p:sld xmlns:a="http://schemas.openxmlformats.org/drawingml/2006/main" xmlns:r="http://schemas.openxmlformats.org/officeDocument/2006/relationships" xmlns:p="http://schemas.openxmlformats.org/presentationml/2006/main">
+  <p:cSld>
+    <p:spTree>
+      <p:nvGrpSpPr>
+        <p:cNvPr id="1" name=""/>
+        <p:cNvGrpSpPr/>
+        <p:nvPr/>
+      </p:nvGrpSpPr>
+      <p:grpSpPr>
+        <a:xfrm>
+          <a:off x="0" y="0"/>
+          <a:ext cx="0" cy="0"/>
+          <a:chOff x="0" y="0"/>
+          <a:chExt cx="0" cy="0"/>
+        </a:xfrm>
+      </p:grpSpPr>
+      <p:sp>
+        <p:nvSpPr>
+          <p:cNvPr id="2" name="Title 1">
+            <a:extLst>
+              <a:ext uri="{FF2B5EF4-FFF2-40B4-BE49-F238E27FC236}">
                 <a16:creationId xmlns:a16="http://schemas.microsoft.com/office/drawing/2014/main" id="{1050456F-9F62-8547-B8A2-6777CADEB992}"/>
               </a:ext>
             </a:extLst>
@@ -4778,43 +5212,55 @@
         <p:spPr>
           <a:xfrm>
             <a:off x="1097280" y="1845734"/>
-            <a:ext cx="8666152" cy="4023360"/>
-          </a:xfrm>
-        </p:spPr>
-        <p:txBody>
-          <a:bodyPr>
+            <a:ext cx="7142153" cy="4023360"/>
+          </a:xfrm>
+        </p:spPr>
+        <p:txBody>
+          <a:bodyPr vert="horz" lIns="0" tIns="45720" rIns="0" bIns="45720" rtlCol="0" anchor="t">
             <a:normAutofit/>
           </a:bodyPr>
           <a:lstStyle/>
           <a:p>
             <a:pPr>
-              <a:buFont typeface="Wingdings" panose="05000000000000000000" pitchFamily="2" charset="2"/>
-              <a:buChar char="§"/>
+              <a:buFont typeface="Arial" panose="020F0502020204030204" pitchFamily="34" charset="0"/>
+              <a:buChar char="•"/>
             </a:pPr>
             <a:r>
               <a:rPr lang="en-US" sz="2800" dirty="0"/>
               <a:t> Add more HTTP methods (POST, DELETE etc.)</a:t>
             </a:r>
+            <a:endParaRPr lang="en-US">
+              <a:ea typeface="Calibri" panose="020F0502020204030204"/>
+              <a:cs typeface="Calibri" panose="020F0502020204030204"/>
+            </a:endParaRPr>
           </a:p>
           <a:p>
             <a:pPr>
-              <a:buFont typeface="Wingdings" panose="05000000000000000000" pitchFamily="2" charset="2"/>
-              <a:buChar char="§"/>
+              <a:buFont typeface="Arial" panose="020F0502020204030204" pitchFamily="34" charset="0"/>
+              <a:buChar char="•"/>
             </a:pPr>
             <a:r>
               <a:rPr lang="en-US" sz="2800" dirty="0"/>
               <a:t> Add HTTPS functionality</a:t>
             </a:r>
+            <a:endParaRPr lang="en-US" sz="2800" dirty="0">
+              <a:ea typeface="Calibri" panose="020F0502020204030204"/>
+              <a:cs typeface="Calibri" panose="020F0502020204030204"/>
+            </a:endParaRPr>
           </a:p>
           <a:p>
             <a:pPr>
-              <a:buFont typeface="Wingdings" panose="05000000000000000000" pitchFamily="2" charset="2"/>
-              <a:buChar char="§"/>
+              <a:buFont typeface="Arial" panose="020F0502020204030204" pitchFamily="34" charset="0"/>
+              <a:buChar char="•"/>
             </a:pPr>
             <a:r>
               <a:rPr lang="en-US" sz="2800" dirty="0"/>
               <a:t> Include more MIME types </a:t>
             </a:r>
+            <a:endParaRPr lang="en-US" sz="2800" dirty="0">
+              <a:ea typeface="Calibri" panose="020F0502020204030204"/>
+              <a:cs typeface="Calibri" panose="020F0502020204030204"/>
+            </a:endParaRPr>
           </a:p>
         </p:txBody>
       </p:sp>
@@ -4831,7 +5277,7 @@
 </p:sld>
 </file>
 
-<file path=ppt/slides/slide8.xml><?xml version="1.0" encoding="utf-8"?>
+<file path=ppt/slides/slide9.xml><?xml version="1.0" encoding="utf-8"?>
 <p:sld xmlns:a="http://schemas.openxmlformats.org/drawingml/2006/main" xmlns:r="http://schemas.openxmlformats.org/officeDocument/2006/relationships" xmlns:p="http://schemas.openxmlformats.org/presentationml/2006/main">
   <p:cSld>
     <p:spTree>

</xml_diff>